<commit_message>
CP: add unique Flatter/Dart OSUI for YunOS
</commit_message>
<xml_diff>
--- a/P(Path)/RP(ReligionPath)/信仰之路（中文）.pptx
+++ b/P(Path)/RP(ReligionPath)/信仰之路（中文）.pptx
@@ -3498,7 +3498,7 @@
         <p:spPr/>
         <p:txBody>
           <a:bodyPr>
-            <a:normAutofit fontScale="92500"/>
+            <a:normAutofit fontScale="92500" lnSpcReduction="10000"/>
           </a:bodyPr>
           <a:lstStyle/>
           <a:p>
@@ -3848,6 +3848,91 @@
               </a:rPr>
               <a:t>)</a:t>
             </a:r>
+          </a:p>
+          <a:p>
+            <a:pPr marL="514350" indent="-514350">
+              <a:buFont typeface="+mj-lt"/>
+              <a:buAutoNum type="arabicPeriod"/>
+            </a:pPr>
+            <a:r>
+              <a:rPr lang="en-US" altLang="zh-CN" b="1" dirty="0">
+                <a:solidFill>
+                  <a:srgbClr val="000000"/>
+                </a:solidFill>
+                <a:latin typeface="宋体" panose="02010600030101010101" pitchFamily="2" charset="-122"/>
+                <a:ea typeface="宋体" panose="02010600030101010101" pitchFamily="2" charset="-122"/>
+                <a:hlinkClick r:id="rId8"/>
+              </a:rPr>
+              <a:t>2006</a:t>
+            </a:r>
+            <a:r>
+              <a:rPr lang="zh-CN" altLang="en-US" b="1" dirty="0">
+                <a:solidFill>
+                  <a:srgbClr val="000000"/>
+                </a:solidFill>
+                <a:latin typeface="宋体" panose="02010600030101010101" pitchFamily="2" charset="-122"/>
+                <a:ea typeface="宋体" panose="02010600030101010101" pitchFamily="2" charset="-122"/>
+                <a:hlinkClick r:id="rId8"/>
+              </a:rPr>
+              <a:t>年</a:t>
+            </a:r>
+            <a:r>
+              <a:rPr lang="en-US" altLang="zh-CN" b="1" dirty="0">
+                <a:solidFill>
+                  <a:srgbClr val="000000"/>
+                </a:solidFill>
+                <a:latin typeface="宋体" panose="02010600030101010101" pitchFamily="2" charset="-122"/>
+                <a:ea typeface="宋体" panose="02010600030101010101" pitchFamily="2" charset="-122"/>
+                <a:hlinkClick r:id="rId8"/>
+              </a:rPr>
+              <a:t>7</a:t>
+            </a:r>
+            <a:r>
+              <a:rPr lang="zh-CN" altLang="en-US" b="1" dirty="0">
+                <a:solidFill>
+                  <a:srgbClr val="000000"/>
+                </a:solidFill>
+                <a:latin typeface="宋体" panose="02010600030101010101" pitchFamily="2" charset="-122"/>
+                <a:ea typeface="宋体" panose="02010600030101010101" pitchFamily="2" charset="-122"/>
+                <a:hlinkClick r:id="rId8"/>
+              </a:rPr>
+              <a:t>月</a:t>
+            </a:r>
+            <a:r>
+              <a:rPr lang="en-US" altLang="zh-CN" b="1" dirty="0">
+                <a:solidFill>
+                  <a:srgbClr val="000000"/>
+                </a:solidFill>
+                <a:latin typeface="宋体" panose="02010600030101010101" pitchFamily="2" charset="-122"/>
+                <a:ea typeface="宋体" panose="02010600030101010101" pitchFamily="2" charset="-122"/>
+                <a:hlinkClick r:id="rId8"/>
+              </a:rPr>
+              <a:t>17</a:t>
+            </a:r>
+            <a:r>
+              <a:rPr lang="zh-CN" altLang="en-US" b="1" dirty="0">
+                <a:solidFill>
+                  <a:srgbClr val="000000"/>
+                </a:solidFill>
+                <a:latin typeface="宋体" panose="02010600030101010101" pitchFamily="2" charset="-122"/>
+                <a:ea typeface="宋体" panose="02010600030101010101" pitchFamily="2" charset="-122"/>
+                <a:hlinkClick r:id="rId8"/>
+              </a:rPr>
+              <a:t>日塞浦路斯和马来西亚常驻联合国代表给秘书长的信</a:t>
+            </a:r>
+            <a:endParaRPr lang="zh-CN" altLang="en-US" b="1" dirty="0">
+              <a:solidFill>
+                <a:srgbClr val="000000"/>
+              </a:solidFill>
+              <a:latin typeface="宋体" panose="02010600030101010101" pitchFamily="2" charset="-122"/>
+              <a:ea typeface="宋体" panose="02010600030101010101" pitchFamily="2" charset="-122"/>
+            </a:endParaRPr>
+          </a:p>
+          <a:p>
+            <a:pPr marL="514350" indent="-514350">
+              <a:buFont typeface="+mj-lt"/>
+              <a:buAutoNum type="arabicPeriod"/>
+            </a:pPr>
             <a:endParaRPr lang="en-DE" dirty="0">
               <a:solidFill>
                 <a:srgbClr val="373737"/>
@@ -4834,6 +4919,10 @@
             <a:r>
               <a:rPr lang="zh-CN" altLang="en-US" dirty="0"/>
               <a:t>让每个人幸福生活的共同道德准则</a:t>
+            </a:r>
+            <a:r>
+              <a:rPr lang="de-DE" altLang="zh-CN" dirty="0"/>
+              <a:t>[7]</a:t>
             </a:r>
             <a:endParaRPr lang="en-US" altLang="zh-CN" dirty="0"/>
           </a:p>

</xml_diff>